<commit_message>
add informations for admin side
</commit_message>
<xml_diff>
--- a/user-flow/user-flow.pptx
+++ b/user-flow/user-flow.pptx
@@ -6,6 +6,7 @@
   </p:sldMasterIdLst>
   <p:sldIdLst>
     <p:sldId id="256" r:id="rId2"/>
+    <p:sldId id="257" r:id="rId3"/>
   </p:sldIdLst>
   <p:sldSz cx="9144000" cy="6858000" type="screen4x3"/>
   <p:notesSz cx="6858000" cy="9144000"/>
@@ -104,6 +105,22 @@
       </a:defRPr>
     </a:lvl9pPr>
   </p:defaultTextStyle>
+  <p:extLst>
+    <p:ext uri="{EFAFB233-063F-42B5-8137-9DF3F51BA10A}">
+      <p15:sldGuideLst xmlns:p15="http://schemas.microsoft.com/office/powerpoint/2012/main">
+        <p15:guide id="1" orient="horz" pos="2160">
+          <p15:clr>
+            <a:srgbClr val="A4A3A4"/>
+          </p15:clr>
+        </p15:guide>
+        <p15:guide id="2" pos="2880">
+          <p15:clr>
+            <a:srgbClr val="A4A3A4"/>
+          </p15:clr>
+        </p15:guide>
+      </p15:sldGuideLst>
+    </p:ext>
+  </p:extLst>
 </p:presentation>
 </file>
 
@@ -288,7 +305,7 @@
           <a:p>
             <a:fld id="{DC11BC59-F3DC-4767-A536-37DB3EDE61DA}" type="datetimeFigureOut">
               <a:rPr lang="en-US" smtClean="0"/>
-              <a:t>11/18/2014</a:t>
+              <a:t>18/11/14</a:t>
             </a:fld>
             <a:endParaRPr lang="en-US"/>
           </a:p>
@@ -458,7 +475,7 @@
           <a:p>
             <a:fld id="{DC11BC59-F3DC-4767-A536-37DB3EDE61DA}" type="datetimeFigureOut">
               <a:rPr lang="en-US" smtClean="0"/>
-              <a:t>11/18/2014</a:t>
+              <a:t>18/11/14</a:t>
             </a:fld>
             <a:endParaRPr lang="en-US"/>
           </a:p>
@@ -638,7 +655,7 @@
           <a:p>
             <a:fld id="{DC11BC59-F3DC-4767-A536-37DB3EDE61DA}" type="datetimeFigureOut">
               <a:rPr lang="en-US" smtClean="0"/>
-              <a:t>11/18/2014</a:t>
+              <a:t>18/11/14</a:t>
             </a:fld>
             <a:endParaRPr lang="en-US"/>
           </a:p>
@@ -808,7 +825,7 @@
           <a:p>
             <a:fld id="{DC11BC59-F3DC-4767-A536-37DB3EDE61DA}" type="datetimeFigureOut">
               <a:rPr lang="en-US" smtClean="0"/>
-              <a:t>11/18/2014</a:t>
+              <a:t>18/11/14</a:t>
             </a:fld>
             <a:endParaRPr lang="en-US"/>
           </a:p>
@@ -1054,7 +1071,7 @@
           <a:p>
             <a:fld id="{DC11BC59-F3DC-4767-A536-37DB3EDE61DA}" type="datetimeFigureOut">
               <a:rPr lang="en-US" smtClean="0"/>
-              <a:t>11/18/2014</a:t>
+              <a:t>18/11/14</a:t>
             </a:fld>
             <a:endParaRPr lang="en-US"/>
           </a:p>
@@ -1342,7 +1359,7 @@
           <a:p>
             <a:fld id="{DC11BC59-F3DC-4767-A536-37DB3EDE61DA}" type="datetimeFigureOut">
               <a:rPr lang="en-US" smtClean="0"/>
-              <a:t>11/18/2014</a:t>
+              <a:t>18/11/14</a:t>
             </a:fld>
             <a:endParaRPr lang="en-US"/>
           </a:p>
@@ -1764,7 +1781,7 @@
           <a:p>
             <a:fld id="{DC11BC59-F3DC-4767-A536-37DB3EDE61DA}" type="datetimeFigureOut">
               <a:rPr lang="en-US" smtClean="0"/>
-              <a:t>11/18/2014</a:t>
+              <a:t>18/11/14</a:t>
             </a:fld>
             <a:endParaRPr lang="en-US"/>
           </a:p>
@@ -1882,7 +1899,7 @@
           <a:p>
             <a:fld id="{DC11BC59-F3DC-4767-A536-37DB3EDE61DA}" type="datetimeFigureOut">
               <a:rPr lang="en-US" smtClean="0"/>
-              <a:t>11/18/2014</a:t>
+              <a:t>18/11/14</a:t>
             </a:fld>
             <a:endParaRPr lang="en-US"/>
           </a:p>
@@ -1977,7 +1994,7 @@
           <a:p>
             <a:fld id="{DC11BC59-F3DC-4767-A536-37DB3EDE61DA}" type="datetimeFigureOut">
               <a:rPr lang="en-US" smtClean="0"/>
-              <a:t>11/18/2014</a:t>
+              <a:t>18/11/14</a:t>
             </a:fld>
             <a:endParaRPr lang="en-US"/>
           </a:p>
@@ -2254,7 +2271,7 @@
           <a:p>
             <a:fld id="{DC11BC59-F3DC-4767-A536-37DB3EDE61DA}" type="datetimeFigureOut">
               <a:rPr lang="en-US" smtClean="0"/>
-              <a:t>11/18/2014</a:t>
+              <a:t>18/11/14</a:t>
             </a:fld>
             <a:endParaRPr lang="en-US"/>
           </a:p>
@@ -2507,7 +2524,7 @@
           <a:p>
             <a:fld id="{DC11BC59-F3DC-4767-A536-37DB3EDE61DA}" type="datetimeFigureOut">
               <a:rPr lang="en-US" smtClean="0"/>
-              <a:t>11/18/2014</a:t>
+              <a:t>18/11/14</a:t>
             </a:fld>
             <a:endParaRPr lang="en-US"/>
           </a:p>
@@ -2720,7 +2737,7 @@
           <a:p>
             <a:fld id="{DC11BC59-F3DC-4767-A536-37DB3EDE61DA}" type="datetimeFigureOut">
               <a:rPr lang="en-US" smtClean="0"/>
-              <a:t>11/18/2014</a:t>
+              <a:t>18/11/14</a:t>
             </a:fld>
             <a:endParaRPr lang="en-US"/>
           </a:p>
@@ -5015,6 +5032,1999 @@
     <p:extLst>
       <p:ext uri="{BB962C8B-B14F-4D97-AF65-F5344CB8AC3E}">
         <p14:creationId xmlns:p14="http://schemas.microsoft.com/office/powerpoint/2010/main" val="808274124"/>
+      </p:ext>
+    </p:extLst>
+  </p:cSld>
+  <p:clrMapOvr>
+    <a:masterClrMapping/>
+  </p:clrMapOvr>
+  <p:timing>
+    <p:tnLst>
+      <p:par>
+        <p:cTn id="1" dur="indefinite" restart="never" nodeType="tmRoot"/>
+      </p:par>
+    </p:tnLst>
+  </p:timing>
+</p:sld>
+</file>
+
+<file path=ppt/slides/slide2.xml><?xml version="1.0" encoding="utf-8"?>
+<p:sld xmlns:a="http://schemas.openxmlformats.org/drawingml/2006/main" xmlns:r="http://schemas.openxmlformats.org/officeDocument/2006/relationships" xmlns:p="http://schemas.openxmlformats.org/presentationml/2006/main">
+  <p:cSld>
+    <p:spTree>
+      <p:nvGrpSpPr>
+        <p:cNvPr id="1" name=""/>
+        <p:cNvGrpSpPr/>
+        <p:nvPr/>
+      </p:nvGrpSpPr>
+      <p:grpSpPr>
+        <a:xfrm>
+          <a:off x="0" y="0"/>
+          <a:ext cx="0" cy="0"/>
+          <a:chOff x="0" y="0"/>
+          <a:chExt cx="0" cy="0"/>
+        </a:xfrm>
+      </p:grpSpPr>
+      <p:sp>
+        <p:nvSpPr>
+          <p:cNvPr id="50" name="Rectangle 49"/>
+          <p:cNvSpPr/>
+          <p:nvPr/>
+        </p:nvSpPr>
+        <p:spPr>
+          <a:xfrm>
+            <a:off x="138546" y="4315691"/>
+            <a:ext cx="1614054" cy="2286000"/>
+          </a:xfrm>
+          <a:prstGeom prst="rect">
+            <a:avLst/>
+          </a:prstGeom>
+          <a:solidFill>
+            <a:schemeClr val="bg1"/>
+          </a:solidFill>
+        </p:spPr>
+        <p:style>
+          <a:lnRef idx="2">
+            <a:schemeClr val="accent1">
+              <a:shade val="50000"/>
+            </a:schemeClr>
+          </a:lnRef>
+          <a:fillRef idx="1">
+            <a:schemeClr val="accent1"/>
+          </a:fillRef>
+          <a:effectRef idx="0">
+            <a:schemeClr val="accent1"/>
+          </a:effectRef>
+          <a:fontRef idx="minor">
+            <a:schemeClr val="lt1"/>
+          </a:fontRef>
+        </p:style>
+        <p:txBody>
+          <a:bodyPr rtlCol="0" anchor="ctr"/>
+          <a:lstStyle/>
+          <a:p>
+            <a:pPr algn="ctr"/>
+            <a:endParaRPr lang="en-US"/>
+          </a:p>
+        </p:txBody>
+      </p:sp>
+      <p:sp>
+        <p:nvSpPr>
+          <p:cNvPr id="4" name="Rectangle 3"/>
+          <p:cNvSpPr/>
+          <p:nvPr/>
+        </p:nvSpPr>
+        <p:spPr>
+          <a:xfrm>
+            <a:off x="762000" y="304800"/>
+            <a:ext cx="990600" cy="304800"/>
+          </a:xfrm>
+          <a:prstGeom prst="rect">
+            <a:avLst/>
+          </a:prstGeom>
+        </p:spPr>
+        <p:style>
+          <a:lnRef idx="2">
+            <a:schemeClr val="accent1">
+              <a:shade val="50000"/>
+            </a:schemeClr>
+          </a:lnRef>
+          <a:fillRef idx="1">
+            <a:schemeClr val="accent1"/>
+          </a:fillRef>
+          <a:effectRef idx="0">
+            <a:schemeClr val="accent1"/>
+          </a:effectRef>
+          <a:fontRef idx="minor">
+            <a:schemeClr val="lt1"/>
+          </a:fontRef>
+        </p:style>
+        <p:txBody>
+          <a:bodyPr rtlCol="0" anchor="ctr"/>
+          <a:lstStyle/>
+          <a:p>
+            <a:pPr algn="ctr"/>
+            <a:r>
+              <a:rPr lang="en-US" dirty="0" smtClean="0"/>
+              <a:t>register</a:t>
+            </a:r>
+            <a:endParaRPr lang="en-US" dirty="0"/>
+          </a:p>
+        </p:txBody>
+      </p:sp>
+      <p:sp>
+        <p:nvSpPr>
+          <p:cNvPr id="5" name="Rectangle 4"/>
+          <p:cNvSpPr/>
+          <p:nvPr/>
+        </p:nvSpPr>
+        <p:spPr>
+          <a:xfrm>
+            <a:off x="3077053" y="280657"/>
+            <a:ext cx="990600" cy="304800"/>
+          </a:xfrm>
+          <a:prstGeom prst="rect">
+            <a:avLst/>
+          </a:prstGeom>
+        </p:spPr>
+        <p:style>
+          <a:lnRef idx="2">
+            <a:schemeClr val="accent1">
+              <a:shade val="50000"/>
+            </a:schemeClr>
+          </a:lnRef>
+          <a:fillRef idx="1">
+            <a:schemeClr val="accent1"/>
+          </a:fillRef>
+          <a:effectRef idx="0">
+            <a:schemeClr val="accent1"/>
+          </a:effectRef>
+          <a:fontRef idx="minor">
+            <a:schemeClr val="lt1"/>
+          </a:fontRef>
+        </p:style>
+        <p:txBody>
+          <a:bodyPr rtlCol="0" anchor="ctr"/>
+          <a:lstStyle/>
+          <a:p>
+            <a:pPr algn="ctr"/>
+            <a:r>
+              <a:rPr lang="en-US" dirty="0" smtClean="0"/>
+              <a:t>login</a:t>
+            </a:r>
+            <a:endParaRPr lang="en-US" dirty="0"/>
+          </a:p>
+        </p:txBody>
+      </p:sp>
+      <p:sp>
+        <p:nvSpPr>
+          <p:cNvPr id="6" name="Rectangle 5"/>
+          <p:cNvSpPr/>
+          <p:nvPr/>
+        </p:nvSpPr>
+        <p:spPr>
+          <a:xfrm>
+            <a:off x="2734153" y="1030247"/>
+            <a:ext cx="1676400" cy="304802"/>
+          </a:xfrm>
+          <a:prstGeom prst="rect">
+            <a:avLst/>
+          </a:prstGeom>
+        </p:spPr>
+        <p:style>
+          <a:lnRef idx="2">
+            <a:schemeClr val="accent1">
+              <a:shade val="50000"/>
+            </a:schemeClr>
+          </a:lnRef>
+          <a:fillRef idx="1">
+            <a:schemeClr val="accent1"/>
+          </a:fillRef>
+          <a:effectRef idx="0">
+            <a:schemeClr val="accent1"/>
+          </a:effectRef>
+          <a:fontRef idx="minor">
+            <a:schemeClr val="lt1"/>
+          </a:fontRef>
+        </p:style>
+        <p:txBody>
+          <a:bodyPr rtlCol="0" anchor="ctr"/>
+          <a:lstStyle/>
+          <a:p>
+            <a:pPr algn="ctr"/>
+            <a:r>
+              <a:rPr lang="en-US" smtClean="0"/>
+              <a:t>List </a:t>
+            </a:r>
+            <a:r>
+              <a:rPr lang="en-US" smtClean="0"/>
+              <a:t>shops</a:t>
+            </a:r>
+            <a:endParaRPr lang="en-US" dirty="0"/>
+          </a:p>
+        </p:txBody>
+      </p:sp>
+      <p:sp>
+        <p:nvSpPr>
+          <p:cNvPr id="7" name="Rectangle 6"/>
+          <p:cNvSpPr/>
+          <p:nvPr/>
+        </p:nvSpPr>
+        <p:spPr>
+          <a:xfrm>
+            <a:off x="4190999" y="1711293"/>
+            <a:ext cx="1842656" cy="304800"/>
+          </a:xfrm>
+          <a:prstGeom prst="rect">
+            <a:avLst/>
+          </a:prstGeom>
+        </p:spPr>
+        <p:style>
+          <a:lnRef idx="2">
+            <a:schemeClr val="accent1">
+              <a:shade val="50000"/>
+            </a:schemeClr>
+          </a:lnRef>
+          <a:fillRef idx="1">
+            <a:schemeClr val="accent1"/>
+          </a:fillRef>
+          <a:effectRef idx="0">
+            <a:schemeClr val="accent1"/>
+          </a:effectRef>
+          <a:fontRef idx="minor">
+            <a:schemeClr val="lt1"/>
+          </a:fontRef>
+        </p:style>
+        <p:txBody>
+          <a:bodyPr rtlCol="0" anchor="ctr"/>
+          <a:lstStyle/>
+          <a:p>
+            <a:pPr algn="ctr"/>
+            <a:r>
+              <a:rPr lang="en-US" smtClean="0"/>
+              <a:t>Create Shop</a:t>
+            </a:r>
+            <a:endParaRPr lang="en-US" dirty="0"/>
+          </a:p>
+        </p:txBody>
+      </p:sp>
+      <p:sp>
+        <p:nvSpPr>
+          <p:cNvPr id="8" name="Rectangle 7"/>
+          <p:cNvSpPr/>
+          <p:nvPr/>
+        </p:nvSpPr>
+        <p:spPr>
+          <a:xfrm>
+            <a:off x="1720211" y="1743758"/>
+            <a:ext cx="1295400" cy="304800"/>
+          </a:xfrm>
+          <a:prstGeom prst="rect">
+            <a:avLst/>
+          </a:prstGeom>
+        </p:spPr>
+        <p:style>
+          <a:lnRef idx="2">
+            <a:schemeClr val="accent1">
+              <a:shade val="50000"/>
+            </a:schemeClr>
+          </a:lnRef>
+          <a:fillRef idx="1">
+            <a:schemeClr val="accent1"/>
+          </a:fillRef>
+          <a:effectRef idx="0">
+            <a:schemeClr val="accent1"/>
+          </a:effectRef>
+          <a:fontRef idx="minor">
+            <a:schemeClr val="lt1"/>
+          </a:fontRef>
+        </p:style>
+        <p:txBody>
+          <a:bodyPr rtlCol="0" anchor="ctr"/>
+          <a:lstStyle/>
+          <a:p>
+            <a:pPr algn="ctr"/>
+            <a:r>
+              <a:rPr lang="en-US" dirty="0" smtClean="0"/>
+              <a:t>Shop’s info</a:t>
+            </a:r>
+            <a:endParaRPr lang="en-US" dirty="0"/>
+          </a:p>
+        </p:txBody>
+      </p:sp>
+      <p:sp>
+        <p:nvSpPr>
+          <p:cNvPr id="9" name="Rectangle 8"/>
+          <p:cNvSpPr/>
+          <p:nvPr/>
+        </p:nvSpPr>
+        <p:spPr>
+          <a:xfrm>
+            <a:off x="365619" y="2943729"/>
+            <a:ext cx="838200" cy="304800"/>
+          </a:xfrm>
+          <a:prstGeom prst="rect">
+            <a:avLst/>
+          </a:prstGeom>
+        </p:spPr>
+        <p:style>
+          <a:lnRef idx="2">
+            <a:schemeClr val="accent1">
+              <a:shade val="50000"/>
+            </a:schemeClr>
+          </a:lnRef>
+          <a:fillRef idx="1">
+            <a:schemeClr val="accent1"/>
+          </a:fillRef>
+          <a:effectRef idx="0">
+            <a:schemeClr val="accent1"/>
+          </a:effectRef>
+          <a:fontRef idx="minor">
+            <a:schemeClr val="lt1"/>
+          </a:fontRef>
+        </p:style>
+        <p:txBody>
+          <a:bodyPr rtlCol="0" anchor="ctr"/>
+          <a:lstStyle/>
+          <a:p>
+            <a:pPr algn="ctr"/>
+            <a:r>
+              <a:rPr lang="en-US" dirty="0" smtClean="0"/>
+              <a:t>info</a:t>
+            </a:r>
+            <a:endParaRPr lang="en-US" dirty="0"/>
+          </a:p>
+        </p:txBody>
+      </p:sp>
+      <p:sp>
+        <p:nvSpPr>
+          <p:cNvPr id="10" name="Rectangle 9"/>
+          <p:cNvSpPr/>
+          <p:nvPr/>
+        </p:nvSpPr>
+        <p:spPr>
+          <a:xfrm>
+            <a:off x="3939498" y="2918474"/>
+            <a:ext cx="942109" cy="304800"/>
+          </a:xfrm>
+          <a:prstGeom prst="rect">
+            <a:avLst/>
+          </a:prstGeom>
+        </p:spPr>
+        <p:style>
+          <a:lnRef idx="2">
+            <a:schemeClr val="accent1">
+              <a:shade val="50000"/>
+            </a:schemeClr>
+          </a:lnRef>
+          <a:fillRef idx="1">
+            <a:schemeClr val="accent1"/>
+          </a:fillRef>
+          <a:effectRef idx="0">
+            <a:schemeClr val="accent1"/>
+          </a:effectRef>
+          <a:fontRef idx="minor">
+            <a:schemeClr val="lt1"/>
+          </a:fontRef>
+        </p:style>
+        <p:txBody>
+          <a:bodyPr rtlCol="0" anchor="ctr"/>
+          <a:lstStyle/>
+          <a:p>
+            <a:pPr algn="ctr"/>
+            <a:r>
+              <a:rPr lang="en-US" dirty="0" smtClean="0"/>
+              <a:t>awards</a:t>
+            </a:r>
+            <a:endParaRPr lang="en-US" dirty="0"/>
+          </a:p>
+        </p:txBody>
+      </p:sp>
+      <p:sp>
+        <p:nvSpPr>
+          <p:cNvPr id="11" name="Rectangle 10"/>
+          <p:cNvSpPr/>
+          <p:nvPr/>
+        </p:nvSpPr>
+        <p:spPr>
+          <a:xfrm>
+            <a:off x="6018868" y="2890587"/>
+            <a:ext cx="1537855" cy="304800"/>
+          </a:xfrm>
+          <a:prstGeom prst="rect">
+            <a:avLst/>
+          </a:prstGeom>
+        </p:spPr>
+        <p:style>
+          <a:lnRef idx="2">
+            <a:schemeClr val="accent1">
+              <a:shade val="50000"/>
+            </a:schemeClr>
+          </a:lnRef>
+          <a:fillRef idx="1">
+            <a:schemeClr val="accent1"/>
+          </a:fillRef>
+          <a:effectRef idx="0">
+            <a:schemeClr val="accent1"/>
+          </a:effectRef>
+          <a:fontRef idx="minor">
+            <a:schemeClr val="lt1"/>
+          </a:fontRef>
+        </p:style>
+        <p:txBody>
+          <a:bodyPr rtlCol="0" anchor="ctr"/>
+          <a:lstStyle/>
+          <a:p>
+            <a:pPr algn="ctr"/>
+            <a:r>
+              <a:rPr lang="en-US" smtClean="0"/>
+              <a:t>Users</a:t>
+            </a:r>
+            <a:endParaRPr lang="en-US" dirty="0"/>
+          </a:p>
+        </p:txBody>
+      </p:sp>
+      <p:sp>
+        <p:nvSpPr>
+          <p:cNvPr id="12" name="Rectangle 11"/>
+          <p:cNvSpPr/>
+          <p:nvPr/>
+        </p:nvSpPr>
+        <p:spPr>
+          <a:xfrm>
+            <a:off x="1624107" y="2890819"/>
+            <a:ext cx="1537855" cy="304800"/>
+          </a:xfrm>
+          <a:prstGeom prst="rect">
+            <a:avLst/>
+          </a:prstGeom>
+        </p:spPr>
+        <p:style>
+          <a:lnRef idx="2">
+            <a:schemeClr val="accent1">
+              <a:shade val="50000"/>
+            </a:schemeClr>
+          </a:lnRef>
+          <a:fillRef idx="1">
+            <a:schemeClr val="accent1"/>
+          </a:fillRef>
+          <a:effectRef idx="0">
+            <a:schemeClr val="accent1"/>
+          </a:effectRef>
+          <a:fontRef idx="minor">
+            <a:schemeClr val="lt1"/>
+          </a:fontRef>
+        </p:style>
+        <p:txBody>
+          <a:bodyPr rtlCol="0" anchor="ctr"/>
+          <a:lstStyle/>
+          <a:p>
+            <a:pPr algn="ctr"/>
+            <a:r>
+              <a:rPr lang="en-US" dirty="0" smtClean="0"/>
+              <a:t>Relative shop</a:t>
+            </a:r>
+            <a:endParaRPr lang="en-US" dirty="0"/>
+          </a:p>
+        </p:txBody>
+      </p:sp>
+      <p:sp>
+        <p:nvSpPr>
+          <p:cNvPr id="13" name="Rectangle 12"/>
+          <p:cNvSpPr/>
+          <p:nvPr/>
+        </p:nvSpPr>
+        <p:spPr>
+          <a:xfrm>
+            <a:off x="272736" y="4495800"/>
+            <a:ext cx="1257300" cy="304800"/>
+          </a:xfrm>
+          <a:prstGeom prst="rect">
+            <a:avLst/>
+          </a:prstGeom>
+        </p:spPr>
+        <p:style>
+          <a:lnRef idx="2">
+            <a:schemeClr val="accent1">
+              <a:shade val="50000"/>
+            </a:schemeClr>
+          </a:lnRef>
+          <a:fillRef idx="1">
+            <a:schemeClr val="accent1"/>
+          </a:fillRef>
+          <a:effectRef idx="0">
+            <a:schemeClr val="accent1"/>
+          </a:effectRef>
+          <a:fontRef idx="minor">
+            <a:schemeClr val="lt1"/>
+          </a:fontRef>
+        </p:style>
+        <p:txBody>
+          <a:bodyPr rtlCol="0" anchor="ctr"/>
+          <a:lstStyle/>
+          <a:p>
+            <a:pPr algn="ctr"/>
+            <a:r>
+              <a:rPr lang="en-US" dirty="0" smtClean="0"/>
+              <a:t>Phone </a:t>
+            </a:r>
+            <a:r>
+              <a:rPr lang="en-US" dirty="0" err="1" smtClean="0"/>
+              <a:t>num</a:t>
+            </a:r>
+            <a:endParaRPr lang="en-US" dirty="0"/>
+          </a:p>
+        </p:txBody>
+      </p:sp>
+      <p:sp>
+        <p:nvSpPr>
+          <p:cNvPr id="14" name="Rectangle 13"/>
+          <p:cNvSpPr/>
+          <p:nvPr/>
+        </p:nvSpPr>
+        <p:spPr>
+          <a:xfrm>
+            <a:off x="232432" y="6216810"/>
+            <a:ext cx="1257300" cy="304800"/>
+          </a:xfrm>
+          <a:prstGeom prst="rect">
+            <a:avLst/>
+          </a:prstGeom>
+        </p:spPr>
+        <p:style>
+          <a:lnRef idx="2">
+            <a:schemeClr val="accent1">
+              <a:shade val="50000"/>
+            </a:schemeClr>
+          </a:lnRef>
+          <a:fillRef idx="1">
+            <a:schemeClr val="accent1"/>
+          </a:fillRef>
+          <a:effectRef idx="0">
+            <a:schemeClr val="accent1"/>
+          </a:effectRef>
+          <a:fontRef idx="minor">
+            <a:schemeClr val="lt1"/>
+          </a:fontRef>
+        </p:style>
+        <p:txBody>
+          <a:bodyPr rtlCol="0" anchor="ctr"/>
+          <a:lstStyle/>
+          <a:p>
+            <a:pPr algn="ctr"/>
+            <a:r>
+              <a:rPr lang="en-US" dirty="0" smtClean="0"/>
+              <a:t>feedback</a:t>
+            </a:r>
+            <a:endParaRPr lang="en-US" dirty="0"/>
+          </a:p>
+        </p:txBody>
+      </p:sp>
+      <p:sp>
+        <p:nvSpPr>
+          <p:cNvPr id="15" name="Rectangle 14"/>
+          <p:cNvSpPr/>
+          <p:nvPr/>
+        </p:nvSpPr>
+        <p:spPr>
+          <a:xfrm>
+            <a:off x="225279" y="4953000"/>
+            <a:ext cx="1257300" cy="304800"/>
+          </a:xfrm>
+          <a:prstGeom prst="rect">
+            <a:avLst/>
+          </a:prstGeom>
+        </p:spPr>
+        <p:style>
+          <a:lnRef idx="2">
+            <a:schemeClr val="accent1">
+              <a:shade val="50000"/>
+            </a:schemeClr>
+          </a:lnRef>
+          <a:fillRef idx="1">
+            <a:schemeClr val="accent1"/>
+          </a:fillRef>
+          <a:effectRef idx="0">
+            <a:schemeClr val="accent1"/>
+          </a:effectRef>
+          <a:fontRef idx="minor">
+            <a:schemeClr val="lt1"/>
+          </a:fontRef>
+        </p:style>
+        <p:txBody>
+          <a:bodyPr rtlCol="0" anchor="ctr"/>
+          <a:lstStyle/>
+          <a:p>
+            <a:pPr algn="ctr"/>
+            <a:r>
+              <a:rPr lang="en-US" dirty="0" smtClean="0"/>
+              <a:t>rating</a:t>
+            </a:r>
+            <a:endParaRPr lang="en-US" dirty="0"/>
+          </a:p>
+        </p:txBody>
+      </p:sp>
+      <p:sp>
+        <p:nvSpPr>
+          <p:cNvPr id="16" name="Rectangle 15"/>
+          <p:cNvSpPr/>
+          <p:nvPr/>
+        </p:nvSpPr>
+        <p:spPr>
+          <a:xfrm>
+            <a:off x="225279" y="5792432"/>
+            <a:ext cx="1472045" cy="304800"/>
+          </a:xfrm>
+          <a:prstGeom prst="rect">
+            <a:avLst/>
+          </a:prstGeom>
+        </p:spPr>
+        <p:style>
+          <a:lnRef idx="2">
+            <a:schemeClr val="accent1">
+              <a:shade val="50000"/>
+            </a:schemeClr>
+          </a:lnRef>
+          <a:fillRef idx="1">
+            <a:schemeClr val="accent1"/>
+          </a:fillRef>
+          <a:effectRef idx="0">
+            <a:schemeClr val="accent1"/>
+          </a:effectRef>
+          <a:fontRef idx="minor">
+            <a:schemeClr val="lt1"/>
+          </a:fontRef>
+        </p:style>
+        <p:txBody>
+          <a:bodyPr rtlCol="0" anchor="ctr"/>
+          <a:lstStyle/>
+          <a:p>
+            <a:pPr algn="ctr"/>
+            <a:r>
+              <a:rPr lang="en-US" dirty="0" smtClean="0"/>
+              <a:t>Map(address)</a:t>
+            </a:r>
+            <a:endParaRPr lang="en-US" dirty="0"/>
+          </a:p>
+        </p:txBody>
+      </p:sp>
+      <p:sp>
+        <p:nvSpPr>
+          <p:cNvPr id="17" name="Rectangle 16"/>
+          <p:cNvSpPr/>
+          <p:nvPr/>
+        </p:nvSpPr>
+        <p:spPr>
+          <a:xfrm>
+            <a:off x="207563" y="5406651"/>
+            <a:ext cx="1472045" cy="304800"/>
+          </a:xfrm>
+          <a:prstGeom prst="rect">
+            <a:avLst/>
+          </a:prstGeom>
+        </p:spPr>
+        <p:style>
+          <a:lnRef idx="2">
+            <a:schemeClr val="accent1">
+              <a:shade val="50000"/>
+            </a:schemeClr>
+          </a:lnRef>
+          <a:fillRef idx="1">
+            <a:schemeClr val="accent1"/>
+          </a:fillRef>
+          <a:effectRef idx="0">
+            <a:schemeClr val="accent1"/>
+          </a:effectRef>
+          <a:fontRef idx="minor">
+            <a:schemeClr val="lt1"/>
+          </a:fontRef>
+        </p:style>
+        <p:txBody>
+          <a:bodyPr rtlCol="0" anchor="ctr"/>
+          <a:lstStyle/>
+          <a:p>
+            <a:pPr algn="ctr"/>
+            <a:r>
+              <a:rPr lang="en-US" dirty="0" smtClean="0"/>
+              <a:t>photo</a:t>
+            </a:r>
+            <a:endParaRPr lang="en-US" dirty="0"/>
+          </a:p>
+        </p:txBody>
+      </p:sp>
+      <p:sp>
+        <p:nvSpPr>
+          <p:cNvPr id="19" name="Rectangle 18"/>
+          <p:cNvSpPr/>
+          <p:nvPr/>
+        </p:nvSpPr>
+        <p:spPr>
+          <a:xfrm>
+            <a:off x="3764369" y="3793755"/>
+            <a:ext cx="1295400" cy="270164"/>
+          </a:xfrm>
+          <a:prstGeom prst="rect">
+            <a:avLst/>
+          </a:prstGeom>
+        </p:spPr>
+        <p:style>
+          <a:lnRef idx="2">
+            <a:schemeClr val="accent1">
+              <a:shade val="50000"/>
+            </a:schemeClr>
+          </a:lnRef>
+          <a:fillRef idx="1">
+            <a:schemeClr val="accent1"/>
+          </a:fillRef>
+          <a:effectRef idx="0">
+            <a:schemeClr val="accent1"/>
+          </a:effectRef>
+          <a:fontRef idx="minor">
+            <a:schemeClr val="lt1"/>
+          </a:fontRef>
+        </p:style>
+        <p:txBody>
+          <a:bodyPr rtlCol="0" anchor="ctr"/>
+          <a:lstStyle/>
+          <a:p>
+            <a:pPr algn="ctr"/>
+            <a:r>
+              <a:rPr lang="en-US" smtClean="0"/>
+              <a:t>Add award</a:t>
+            </a:r>
+            <a:endParaRPr lang="en-US" dirty="0"/>
+          </a:p>
+        </p:txBody>
+      </p:sp>
+      <p:sp>
+        <p:nvSpPr>
+          <p:cNvPr id="21" name="Rectangle 20"/>
+          <p:cNvSpPr/>
+          <p:nvPr/>
+        </p:nvSpPr>
+        <p:spPr>
+          <a:xfrm>
+            <a:off x="6033655" y="276207"/>
+            <a:ext cx="1371600" cy="304800"/>
+          </a:xfrm>
+          <a:prstGeom prst="rect">
+            <a:avLst/>
+          </a:prstGeom>
+        </p:spPr>
+        <p:style>
+          <a:lnRef idx="2">
+            <a:schemeClr val="accent1">
+              <a:shade val="50000"/>
+            </a:schemeClr>
+          </a:lnRef>
+          <a:fillRef idx="1">
+            <a:schemeClr val="accent1"/>
+          </a:fillRef>
+          <a:effectRef idx="0">
+            <a:schemeClr val="accent1"/>
+          </a:effectRef>
+          <a:fontRef idx="minor">
+            <a:schemeClr val="lt1"/>
+          </a:fontRef>
+        </p:style>
+        <p:txBody>
+          <a:bodyPr rtlCol="0" anchor="ctr"/>
+          <a:lstStyle/>
+          <a:p>
+            <a:pPr algn="ctr"/>
+            <a:r>
+              <a:rPr lang="en-US" dirty="0" smtClean="0"/>
+              <a:t>introduce</a:t>
+            </a:r>
+            <a:endParaRPr lang="en-US" dirty="0"/>
+          </a:p>
+        </p:txBody>
+      </p:sp>
+      <p:cxnSp>
+        <p:nvCxnSpPr>
+          <p:cNvPr id="26" name="Straight Arrow Connector 25"/>
+          <p:cNvCxnSpPr>
+            <a:stCxn id="4" idx="3"/>
+            <a:endCxn id="5" idx="1"/>
+          </p:cNvCxnSpPr>
+          <p:nvPr/>
+        </p:nvCxnSpPr>
+        <p:spPr>
+          <a:xfrm flipV="1">
+            <a:off x="1752600" y="433057"/>
+            <a:ext cx="1324453" cy="24143"/>
+          </a:xfrm>
+          <a:prstGeom prst="straightConnector1">
+            <a:avLst/>
+          </a:prstGeom>
+          <a:ln>
+            <a:tailEnd type="arrow"/>
+          </a:ln>
+        </p:spPr>
+        <p:style>
+          <a:lnRef idx="1">
+            <a:schemeClr val="accent1"/>
+          </a:lnRef>
+          <a:fillRef idx="0">
+            <a:schemeClr val="accent1"/>
+          </a:fillRef>
+          <a:effectRef idx="0">
+            <a:schemeClr val="accent1"/>
+          </a:effectRef>
+          <a:fontRef idx="minor">
+            <a:schemeClr val="tx1"/>
+          </a:fontRef>
+        </p:style>
+      </p:cxnSp>
+      <p:cxnSp>
+        <p:nvCxnSpPr>
+          <p:cNvPr id="27" name="Straight Arrow Connector 26"/>
+          <p:cNvCxnSpPr>
+            <a:stCxn id="5" idx="2"/>
+            <a:endCxn id="6" idx="0"/>
+          </p:cNvCxnSpPr>
+          <p:nvPr/>
+        </p:nvCxnSpPr>
+        <p:spPr>
+          <a:xfrm>
+            <a:off x="3572353" y="585457"/>
+            <a:ext cx="0" cy="444790"/>
+          </a:xfrm>
+          <a:prstGeom prst="straightConnector1">
+            <a:avLst/>
+          </a:prstGeom>
+          <a:ln>
+            <a:tailEnd type="arrow"/>
+          </a:ln>
+        </p:spPr>
+        <p:style>
+          <a:lnRef idx="1">
+            <a:schemeClr val="accent1"/>
+          </a:lnRef>
+          <a:fillRef idx="0">
+            <a:schemeClr val="accent1"/>
+          </a:fillRef>
+          <a:effectRef idx="0">
+            <a:schemeClr val="accent1"/>
+          </a:effectRef>
+          <a:fontRef idx="minor">
+            <a:schemeClr val="tx1"/>
+          </a:fontRef>
+        </p:style>
+      </p:cxnSp>
+      <p:cxnSp>
+        <p:nvCxnSpPr>
+          <p:cNvPr id="29" name="Straight Arrow Connector 28"/>
+          <p:cNvCxnSpPr>
+            <a:endCxn id="8" idx="0"/>
+          </p:cNvCxnSpPr>
+          <p:nvPr/>
+        </p:nvCxnSpPr>
+        <p:spPr>
+          <a:xfrm flipH="1">
+            <a:off x="2367911" y="1269239"/>
+            <a:ext cx="1396458" cy="474519"/>
+          </a:xfrm>
+          <a:prstGeom prst="straightConnector1">
+            <a:avLst/>
+          </a:prstGeom>
+          <a:ln>
+            <a:tailEnd type="arrow"/>
+          </a:ln>
+        </p:spPr>
+        <p:style>
+          <a:lnRef idx="1">
+            <a:schemeClr val="accent1"/>
+          </a:lnRef>
+          <a:fillRef idx="0">
+            <a:schemeClr val="accent1"/>
+          </a:fillRef>
+          <a:effectRef idx="0">
+            <a:schemeClr val="accent1"/>
+          </a:effectRef>
+          <a:fontRef idx="minor">
+            <a:schemeClr val="tx1"/>
+          </a:fontRef>
+        </p:style>
+      </p:cxnSp>
+      <p:cxnSp>
+        <p:nvCxnSpPr>
+          <p:cNvPr id="31" name="Straight Arrow Connector 30"/>
+          <p:cNvCxnSpPr>
+            <a:stCxn id="6" idx="2"/>
+            <a:endCxn id="7" idx="0"/>
+          </p:cNvCxnSpPr>
+          <p:nvPr/>
+        </p:nvCxnSpPr>
+        <p:spPr>
+          <a:xfrm>
+            <a:off x="3572353" y="1335049"/>
+            <a:ext cx="1539974" cy="376244"/>
+          </a:xfrm>
+          <a:prstGeom prst="straightConnector1">
+            <a:avLst/>
+          </a:prstGeom>
+          <a:ln>
+            <a:tailEnd type="arrow"/>
+          </a:ln>
+        </p:spPr>
+        <p:style>
+          <a:lnRef idx="1">
+            <a:schemeClr val="accent1"/>
+          </a:lnRef>
+          <a:fillRef idx="0">
+            <a:schemeClr val="accent1"/>
+          </a:fillRef>
+          <a:effectRef idx="0">
+            <a:schemeClr val="accent1"/>
+          </a:effectRef>
+          <a:fontRef idx="minor">
+            <a:schemeClr val="tx1"/>
+          </a:fontRef>
+        </p:style>
+      </p:cxnSp>
+      <p:cxnSp>
+        <p:nvCxnSpPr>
+          <p:cNvPr id="42" name="Straight Arrow Connector 41"/>
+          <p:cNvCxnSpPr>
+            <a:stCxn id="5" idx="3"/>
+            <a:endCxn id="21" idx="1"/>
+          </p:cNvCxnSpPr>
+          <p:nvPr/>
+        </p:nvCxnSpPr>
+        <p:spPr>
+          <a:xfrm flipV="1">
+            <a:off x="4067653" y="428607"/>
+            <a:ext cx="1966002" cy="4450"/>
+          </a:xfrm>
+          <a:prstGeom prst="straightConnector1">
+            <a:avLst/>
+          </a:prstGeom>
+          <a:ln>
+            <a:tailEnd type="arrow"/>
+          </a:ln>
+        </p:spPr>
+        <p:style>
+          <a:lnRef idx="1">
+            <a:schemeClr val="accent1"/>
+          </a:lnRef>
+          <a:fillRef idx="0">
+            <a:schemeClr val="accent1"/>
+          </a:fillRef>
+          <a:effectRef idx="0">
+            <a:schemeClr val="accent1"/>
+          </a:effectRef>
+          <a:fontRef idx="minor">
+            <a:schemeClr val="tx1"/>
+          </a:fontRef>
+        </p:style>
+      </p:cxnSp>
+      <p:cxnSp>
+        <p:nvCxnSpPr>
+          <p:cNvPr id="47" name="Straight Arrow Connector 46"/>
+          <p:cNvCxnSpPr>
+            <a:stCxn id="8" idx="2"/>
+          </p:cNvCxnSpPr>
+          <p:nvPr/>
+        </p:nvCxnSpPr>
+        <p:spPr>
+          <a:xfrm flipH="1">
+            <a:off x="874167" y="2048558"/>
+            <a:ext cx="1493744" cy="826881"/>
+          </a:xfrm>
+          <a:prstGeom prst="straightConnector1">
+            <a:avLst/>
+          </a:prstGeom>
+          <a:ln>
+            <a:tailEnd type="arrow"/>
+          </a:ln>
+        </p:spPr>
+        <p:style>
+          <a:lnRef idx="1">
+            <a:schemeClr val="accent1"/>
+          </a:lnRef>
+          <a:fillRef idx="0">
+            <a:schemeClr val="accent1"/>
+          </a:fillRef>
+          <a:effectRef idx="0">
+            <a:schemeClr val="accent1"/>
+          </a:effectRef>
+          <a:fontRef idx="minor">
+            <a:schemeClr val="tx1"/>
+          </a:fontRef>
+        </p:style>
+      </p:cxnSp>
+      <p:cxnSp>
+        <p:nvCxnSpPr>
+          <p:cNvPr id="51" name="Straight Arrow Connector 50"/>
+          <p:cNvCxnSpPr>
+            <a:stCxn id="9" idx="2"/>
+          </p:cNvCxnSpPr>
+          <p:nvPr/>
+        </p:nvCxnSpPr>
+        <p:spPr>
+          <a:xfrm>
+            <a:off x="784719" y="3248529"/>
+            <a:ext cx="0" cy="1011847"/>
+          </a:xfrm>
+          <a:prstGeom prst="straightConnector1">
+            <a:avLst/>
+          </a:prstGeom>
+          <a:ln>
+            <a:tailEnd type="arrow"/>
+          </a:ln>
+        </p:spPr>
+        <p:style>
+          <a:lnRef idx="1">
+            <a:schemeClr val="accent1"/>
+          </a:lnRef>
+          <a:fillRef idx="0">
+            <a:schemeClr val="accent1"/>
+          </a:fillRef>
+          <a:effectRef idx="0">
+            <a:schemeClr val="accent1"/>
+          </a:effectRef>
+          <a:fontRef idx="minor">
+            <a:schemeClr val="tx1"/>
+          </a:fontRef>
+        </p:style>
+      </p:cxnSp>
+      <p:cxnSp>
+        <p:nvCxnSpPr>
+          <p:cNvPr id="54" name="Straight Arrow Connector 53"/>
+          <p:cNvCxnSpPr>
+            <a:stCxn id="10" idx="2"/>
+            <a:endCxn id="19" idx="0"/>
+          </p:cNvCxnSpPr>
+          <p:nvPr/>
+        </p:nvCxnSpPr>
+        <p:spPr>
+          <a:xfrm>
+            <a:off x="4410553" y="3223274"/>
+            <a:ext cx="1516" cy="570481"/>
+          </a:xfrm>
+          <a:prstGeom prst="straightConnector1">
+            <a:avLst/>
+          </a:prstGeom>
+          <a:ln>
+            <a:tailEnd type="arrow"/>
+          </a:ln>
+        </p:spPr>
+        <p:style>
+          <a:lnRef idx="1">
+            <a:schemeClr val="accent1"/>
+          </a:lnRef>
+          <a:fillRef idx="0">
+            <a:schemeClr val="accent1"/>
+          </a:fillRef>
+          <a:effectRef idx="0">
+            <a:schemeClr val="accent1"/>
+          </a:effectRef>
+          <a:fontRef idx="minor">
+            <a:schemeClr val="tx1"/>
+          </a:fontRef>
+        </p:style>
+      </p:cxnSp>
+      <p:cxnSp>
+        <p:nvCxnSpPr>
+          <p:cNvPr id="60" name="Straight Arrow Connector 59"/>
+          <p:cNvCxnSpPr>
+            <a:stCxn id="8" idx="2"/>
+            <a:endCxn id="12" idx="0"/>
+          </p:cNvCxnSpPr>
+          <p:nvPr/>
+        </p:nvCxnSpPr>
+        <p:spPr>
+          <a:xfrm>
+            <a:off x="2367911" y="2048558"/>
+            <a:ext cx="25124" cy="842261"/>
+          </a:xfrm>
+          <a:prstGeom prst="straightConnector1">
+            <a:avLst/>
+          </a:prstGeom>
+          <a:ln>
+            <a:tailEnd type="arrow"/>
+          </a:ln>
+        </p:spPr>
+        <p:style>
+          <a:lnRef idx="1">
+            <a:schemeClr val="accent1"/>
+          </a:lnRef>
+          <a:fillRef idx="0">
+            <a:schemeClr val="accent1"/>
+          </a:fillRef>
+          <a:effectRef idx="0">
+            <a:schemeClr val="accent1"/>
+          </a:effectRef>
+          <a:fontRef idx="minor">
+            <a:schemeClr val="tx1"/>
+          </a:fontRef>
+        </p:style>
+      </p:cxnSp>
+      <p:cxnSp>
+        <p:nvCxnSpPr>
+          <p:cNvPr id="63" name="Straight Arrow Connector 62"/>
+          <p:cNvCxnSpPr>
+            <a:stCxn id="8" idx="2"/>
+            <a:endCxn id="11" idx="1"/>
+          </p:cNvCxnSpPr>
+          <p:nvPr/>
+        </p:nvCxnSpPr>
+        <p:spPr>
+          <a:xfrm>
+            <a:off x="2367911" y="2048558"/>
+            <a:ext cx="3650957" cy="994429"/>
+          </a:xfrm>
+          <a:prstGeom prst="straightConnector1">
+            <a:avLst/>
+          </a:prstGeom>
+          <a:ln>
+            <a:tailEnd type="arrow"/>
+          </a:ln>
+        </p:spPr>
+        <p:style>
+          <a:lnRef idx="1">
+            <a:schemeClr val="accent1"/>
+          </a:lnRef>
+          <a:fillRef idx="0">
+            <a:schemeClr val="accent1"/>
+          </a:fillRef>
+          <a:effectRef idx="0">
+            <a:schemeClr val="accent1"/>
+          </a:effectRef>
+          <a:fontRef idx="minor">
+            <a:schemeClr val="tx1"/>
+          </a:fontRef>
+        </p:style>
+      </p:cxnSp>
+      <p:sp>
+        <p:nvSpPr>
+          <p:cNvPr id="68" name="TextBox 67"/>
+          <p:cNvSpPr txBox="1"/>
+          <p:nvPr/>
+        </p:nvSpPr>
+        <p:spPr>
+          <a:xfrm>
+            <a:off x="4704265" y="135214"/>
+            <a:ext cx="1066189" cy="369332"/>
+          </a:xfrm>
+          <a:prstGeom prst="rect">
+            <a:avLst/>
+          </a:prstGeom>
+          <a:noFill/>
+        </p:spPr>
+        <p:txBody>
+          <a:bodyPr wrap="none" rtlCol="0">
+            <a:spAutoFit/>
+          </a:bodyPr>
+          <a:lstStyle/>
+          <a:p>
+            <a:r>
+              <a:rPr lang="en-US" dirty="0" smtClean="0"/>
+              <a:t>First time</a:t>
+            </a:r>
+            <a:endParaRPr lang="en-US" dirty="0"/>
+          </a:p>
+        </p:txBody>
+      </p:sp>
+      <p:cxnSp>
+        <p:nvCxnSpPr>
+          <p:cNvPr id="74" name="Straight Arrow Connector 73"/>
+          <p:cNvCxnSpPr>
+            <a:stCxn id="8" idx="2"/>
+          </p:cNvCxnSpPr>
+          <p:nvPr/>
+        </p:nvCxnSpPr>
+        <p:spPr>
+          <a:xfrm>
+            <a:off x="2367911" y="2048558"/>
+            <a:ext cx="1571587" cy="826881"/>
+          </a:xfrm>
+          <a:prstGeom prst="straightConnector1">
+            <a:avLst/>
+          </a:prstGeom>
+          <a:ln>
+            <a:tailEnd type="arrow"/>
+          </a:ln>
+        </p:spPr>
+        <p:style>
+          <a:lnRef idx="1">
+            <a:schemeClr val="accent1"/>
+          </a:lnRef>
+          <a:fillRef idx="0">
+            <a:schemeClr val="accent1"/>
+          </a:fillRef>
+          <a:effectRef idx="0">
+            <a:schemeClr val="accent1"/>
+          </a:effectRef>
+          <a:fontRef idx="minor">
+            <a:schemeClr val="tx1"/>
+          </a:fontRef>
+        </p:style>
+      </p:cxnSp>
+      <p:cxnSp>
+        <p:nvCxnSpPr>
+          <p:cNvPr id="30" name="Straight Arrow Connector 29"/>
+          <p:cNvCxnSpPr>
+            <a:endCxn id="6" idx="3"/>
+          </p:cNvCxnSpPr>
+          <p:nvPr/>
+        </p:nvCxnSpPr>
+        <p:spPr>
+          <a:xfrm flipH="1">
+            <a:off x="4410553" y="561266"/>
+            <a:ext cx="2348518" cy="621382"/>
+          </a:xfrm>
+          <a:prstGeom prst="straightConnector1">
+            <a:avLst/>
+          </a:prstGeom>
+          <a:ln>
+            <a:tailEnd type="triangle"/>
+          </a:ln>
+        </p:spPr>
+        <p:style>
+          <a:lnRef idx="1">
+            <a:schemeClr val="accent1"/>
+          </a:lnRef>
+          <a:fillRef idx="0">
+            <a:schemeClr val="accent1"/>
+          </a:fillRef>
+          <a:effectRef idx="0">
+            <a:schemeClr val="accent1"/>
+          </a:effectRef>
+          <a:fontRef idx="minor">
+            <a:schemeClr val="tx1"/>
+          </a:fontRef>
+        </p:style>
+      </p:cxnSp>
+      <p:sp>
+        <p:nvSpPr>
+          <p:cNvPr id="35" name="Rectangle 34"/>
+          <p:cNvSpPr/>
+          <p:nvPr/>
+        </p:nvSpPr>
+        <p:spPr>
+          <a:xfrm>
+            <a:off x="1490035" y="3677065"/>
+            <a:ext cx="1849582" cy="405245"/>
+          </a:xfrm>
+          <a:prstGeom prst="rect">
+            <a:avLst/>
+          </a:prstGeom>
+        </p:spPr>
+        <p:style>
+          <a:lnRef idx="2">
+            <a:schemeClr val="accent1">
+              <a:shade val="50000"/>
+            </a:schemeClr>
+          </a:lnRef>
+          <a:fillRef idx="1">
+            <a:schemeClr val="accent1"/>
+          </a:fillRef>
+          <a:effectRef idx="0">
+            <a:schemeClr val="accent1"/>
+          </a:effectRef>
+          <a:fontRef idx="minor">
+            <a:schemeClr val="lt1"/>
+          </a:fontRef>
+        </p:style>
+        <p:txBody>
+          <a:bodyPr rtlCol="0" anchor="ctr"/>
+          <a:lstStyle/>
+          <a:p>
+            <a:pPr algn="ctr"/>
+            <a:r>
+              <a:rPr lang="en-US" smtClean="0"/>
+              <a:t>Add relative shop</a:t>
+            </a:r>
+            <a:endParaRPr lang="en-US"/>
+          </a:p>
+        </p:txBody>
+      </p:sp>
+      <p:cxnSp>
+        <p:nvCxnSpPr>
+          <p:cNvPr id="38" name="Straight Arrow Connector 37"/>
+          <p:cNvCxnSpPr>
+            <a:stCxn id="12" idx="2"/>
+            <a:endCxn id="35" idx="0"/>
+          </p:cNvCxnSpPr>
+          <p:nvPr/>
+        </p:nvCxnSpPr>
+        <p:spPr>
+          <a:xfrm>
+            <a:off x="2393035" y="3195619"/>
+            <a:ext cx="21791" cy="481446"/>
+          </a:xfrm>
+          <a:prstGeom prst="straightConnector1">
+            <a:avLst/>
+          </a:prstGeom>
+          <a:ln>
+            <a:tailEnd type="triangle"/>
+          </a:ln>
+        </p:spPr>
+        <p:style>
+          <a:lnRef idx="1">
+            <a:schemeClr val="accent1"/>
+          </a:lnRef>
+          <a:fillRef idx="0">
+            <a:schemeClr val="accent1"/>
+          </a:fillRef>
+          <a:effectRef idx="0">
+            <a:schemeClr val="accent1"/>
+          </a:effectRef>
+          <a:fontRef idx="minor">
+            <a:schemeClr val="tx1"/>
+          </a:fontRef>
+        </p:style>
+      </p:cxnSp>
+      <p:sp>
+        <p:nvSpPr>
+          <p:cNvPr id="113" name="Rectangle 112"/>
+          <p:cNvSpPr/>
+          <p:nvPr/>
+        </p:nvSpPr>
+        <p:spPr>
+          <a:xfrm>
+            <a:off x="5918422" y="3765081"/>
+            <a:ext cx="1738745" cy="327858"/>
+          </a:xfrm>
+          <a:prstGeom prst="rect">
+            <a:avLst/>
+          </a:prstGeom>
+        </p:spPr>
+        <p:style>
+          <a:lnRef idx="2">
+            <a:schemeClr val="accent1">
+              <a:shade val="50000"/>
+            </a:schemeClr>
+          </a:lnRef>
+          <a:fillRef idx="1">
+            <a:schemeClr val="accent1"/>
+          </a:fillRef>
+          <a:effectRef idx="0">
+            <a:schemeClr val="accent1"/>
+          </a:effectRef>
+          <a:fontRef idx="minor">
+            <a:schemeClr val="lt1"/>
+          </a:fontRef>
+        </p:style>
+        <p:txBody>
+          <a:bodyPr rtlCol="0" anchor="ctr"/>
+          <a:lstStyle/>
+          <a:p>
+            <a:pPr algn="ctr"/>
+            <a:r>
+              <a:rPr lang="en-US" smtClean="0"/>
+              <a:t>User details</a:t>
+            </a:r>
+            <a:endParaRPr lang="en-US"/>
+          </a:p>
+        </p:txBody>
+      </p:sp>
+      <p:sp>
+        <p:nvSpPr>
+          <p:cNvPr id="115" name="TextBox 114"/>
+          <p:cNvSpPr txBox="1"/>
+          <p:nvPr/>
+        </p:nvSpPr>
+        <p:spPr>
+          <a:xfrm>
+            <a:off x="6759071" y="822622"/>
+            <a:ext cx="1647246" cy="1754326"/>
+          </a:xfrm>
+          <a:prstGeom prst="rect">
+            <a:avLst/>
+          </a:prstGeom>
+          <a:noFill/>
+        </p:spPr>
+        <p:txBody>
+          <a:bodyPr wrap="none" rtlCol="0">
+            <a:spAutoFit/>
+          </a:bodyPr>
+          <a:lstStyle/>
+          <a:p>
+            <a:pPr marL="285750" indent="-285750">
+              <a:buFontTx/>
+              <a:buChar char="-"/>
+            </a:pPr>
+            <a:r>
+              <a:rPr lang="en-US" smtClean="0"/>
+              <a:t>List users</a:t>
+            </a:r>
+          </a:p>
+          <a:p>
+            <a:pPr marL="285750" indent="-285750">
+              <a:buFontTx/>
+              <a:buChar char="-"/>
+            </a:pPr>
+            <a:r>
+              <a:rPr lang="en-US" smtClean="0"/>
+              <a:t>Search users</a:t>
+            </a:r>
+          </a:p>
+          <a:p>
+            <a:pPr marL="285750" indent="-285750">
+              <a:buFontTx/>
+              <a:buChar char="-"/>
+            </a:pPr>
+            <a:r>
+              <a:rPr lang="en-US" smtClean="0"/>
+              <a:t>Sort users:</a:t>
+            </a:r>
+          </a:p>
+          <a:p>
+            <a:r>
+              <a:rPr lang="en-US" smtClean="0"/>
+              <a:t>+ Name</a:t>
+            </a:r>
+          </a:p>
+          <a:p>
+            <a:r>
+              <a:rPr lang="en-US" smtClean="0"/>
+              <a:t>+ Total Point</a:t>
+            </a:r>
+          </a:p>
+          <a:p>
+            <a:r>
+              <a:rPr lang="en-US" smtClean="0"/>
+              <a:t>+ Current Point</a:t>
+            </a:r>
+          </a:p>
+        </p:txBody>
+      </p:sp>
+      <p:cxnSp>
+        <p:nvCxnSpPr>
+          <p:cNvPr id="119" name="Straight Arrow Connector 118"/>
+          <p:cNvCxnSpPr/>
+          <p:nvPr/>
+        </p:nvCxnSpPr>
+        <p:spPr>
+          <a:xfrm flipV="1">
+            <a:off x="7239000" y="2576948"/>
+            <a:ext cx="0" cy="313639"/>
+          </a:xfrm>
+          <a:prstGeom prst="straightConnector1">
+            <a:avLst/>
+          </a:prstGeom>
+          <a:ln>
+            <a:tailEnd type="triangle"/>
+          </a:ln>
+        </p:spPr>
+        <p:style>
+          <a:lnRef idx="1">
+            <a:schemeClr val="accent1"/>
+          </a:lnRef>
+          <a:fillRef idx="0">
+            <a:schemeClr val="accent1"/>
+          </a:fillRef>
+          <a:effectRef idx="0">
+            <a:schemeClr val="accent1"/>
+          </a:effectRef>
+          <a:fontRef idx="minor">
+            <a:schemeClr val="tx1"/>
+          </a:fontRef>
+        </p:style>
+      </p:cxnSp>
+      <p:cxnSp>
+        <p:nvCxnSpPr>
+          <p:cNvPr id="124" name="Straight Arrow Connector 123"/>
+          <p:cNvCxnSpPr>
+            <a:stCxn id="11" idx="2"/>
+            <a:endCxn id="113" idx="0"/>
+          </p:cNvCxnSpPr>
+          <p:nvPr/>
+        </p:nvCxnSpPr>
+        <p:spPr>
+          <a:xfrm flipH="1">
+            <a:off x="6787795" y="3195387"/>
+            <a:ext cx="1" cy="569694"/>
+          </a:xfrm>
+          <a:prstGeom prst="straightConnector1">
+            <a:avLst/>
+          </a:prstGeom>
+          <a:ln>
+            <a:tailEnd type="triangle"/>
+          </a:ln>
+        </p:spPr>
+        <p:style>
+          <a:lnRef idx="1">
+            <a:schemeClr val="accent1"/>
+          </a:lnRef>
+          <a:fillRef idx="0">
+            <a:schemeClr val="accent1"/>
+          </a:fillRef>
+          <a:effectRef idx="0">
+            <a:schemeClr val="accent1"/>
+          </a:effectRef>
+          <a:fontRef idx="minor">
+            <a:schemeClr val="tx1"/>
+          </a:fontRef>
+        </p:style>
+      </p:cxnSp>
+      <p:sp>
+        <p:nvSpPr>
+          <p:cNvPr id="126" name="Rectangle 125"/>
+          <p:cNvSpPr/>
+          <p:nvPr/>
+        </p:nvSpPr>
+        <p:spPr>
+          <a:xfrm>
+            <a:off x="4342340" y="4800600"/>
+            <a:ext cx="1144060" cy="304800"/>
+          </a:xfrm>
+          <a:prstGeom prst="rect">
+            <a:avLst/>
+          </a:prstGeom>
+        </p:spPr>
+        <p:style>
+          <a:lnRef idx="2">
+            <a:schemeClr val="accent1">
+              <a:shade val="50000"/>
+            </a:schemeClr>
+          </a:lnRef>
+          <a:fillRef idx="1">
+            <a:schemeClr val="accent1"/>
+          </a:fillRef>
+          <a:effectRef idx="0">
+            <a:schemeClr val="accent1"/>
+          </a:effectRef>
+          <a:fontRef idx="minor">
+            <a:schemeClr val="lt1"/>
+          </a:fontRef>
+        </p:style>
+        <p:txBody>
+          <a:bodyPr rtlCol="0" anchor="ctr"/>
+          <a:lstStyle/>
+          <a:p>
+            <a:pPr algn="ctr"/>
+            <a:r>
+              <a:rPr lang="en-US" smtClean="0"/>
+              <a:t>User info</a:t>
+            </a:r>
+            <a:endParaRPr lang="en-US"/>
+          </a:p>
+        </p:txBody>
+      </p:sp>
+      <p:sp>
+        <p:nvSpPr>
+          <p:cNvPr id="127" name="Rectangle 126"/>
+          <p:cNvSpPr/>
+          <p:nvPr/>
+        </p:nvSpPr>
+        <p:spPr>
+          <a:xfrm>
+            <a:off x="4535669" y="5678675"/>
+            <a:ext cx="1144060" cy="682247"/>
+          </a:xfrm>
+          <a:prstGeom prst="rect">
+            <a:avLst/>
+          </a:prstGeom>
+        </p:spPr>
+        <p:style>
+          <a:lnRef idx="2">
+            <a:schemeClr val="accent1">
+              <a:shade val="50000"/>
+            </a:schemeClr>
+          </a:lnRef>
+          <a:fillRef idx="1">
+            <a:schemeClr val="accent1"/>
+          </a:fillRef>
+          <a:effectRef idx="0">
+            <a:schemeClr val="accent1"/>
+          </a:effectRef>
+          <a:fontRef idx="minor">
+            <a:schemeClr val="lt1"/>
+          </a:fontRef>
+        </p:style>
+        <p:txBody>
+          <a:bodyPr rtlCol="0" anchor="ctr"/>
+          <a:lstStyle/>
+          <a:p>
+            <a:pPr algn="ctr"/>
+            <a:r>
+              <a:rPr lang="en-US" smtClean="0"/>
+              <a:t>Update point</a:t>
+            </a:r>
+            <a:endParaRPr lang="en-US"/>
+          </a:p>
+        </p:txBody>
+      </p:sp>
+      <p:sp>
+        <p:nvSpPr>
+          <p:cNvPr id="128" name="Rectangle 127"/>
+          <p:cNvSpPr/>
+          <p:nvPr/>
+        </p:nvSpPr>
+        <p:spPr>
+          <a:xfrm>
+            <a:off x="5770454" y="4800600"/>
+            <a:ext cx="1468546" cy="304800"/>
+          </a:xfrm>
+          <a:prstGeom prst="rect">
+            <a:avLst/>
+          </a:prstGeom>
+        </p:spPr>
+        <p:style>
+          <a:lnRef idx="2">
+            <a:schemeClr val="accent1">
+              <a:shade val="50000"/>
+            </a:schemeClr>
+          </a:lnRef>
+          <a:fillRef idx="1">
+            <a:schemeClr val="accent1"/>
+          </a:fillRef>
+          <a:effectRef idx="0">
+            <a:schemeClr val="accent1"/>
+          </a:effectRef>
+          <a:fontRef idx="minor">
+            <a:schemeClr val="lt1"/>
+          </a:fontRef>
+        </p:style>
+        <p:txBody>
+          <a:bodyPr rtlCol="0" anchor="ctr"/>
+          <a:lstStyle/>
+          <a:p>
+            <a:pPr algn="ctr"/>
+            <a:r>
+              <a:rPr lang="en-US" smtClean="0"/>
+              <a:t>User awards</a:t>
+            </a:r>
+            <a:endParaRPr lang="en-US"/>
+          </a:p>
+        </p:txBody>
+      </p:sp>
+      <p:sp>
+        <p:nvSpPr>
+          <p:cNvPr id="129" name="Rectangle 128"/>
+          <p:cNvSpPr/>
+          <p:nvPr/>
+        </p:nvSpPr>
+        <p:spPr>
+          <a:xfrm>
+            <a:off x="5932697" y="5678676"/>
+            <a:ext cx="1144060" cy="682247"/>
+          </a:xfrm>
+          <a:prstGeom prst="rect">
+            <a:avLst/>
+          </a:prstGeom>
+        </p:spPr>
+        <p:style>
+          <a:lnRef idx="2">
+            <a:schemeClr val="accent1">
+              <a:shade val="50000"/>
+            </a:schemeClr>
+          </a:lnRef>
+          <a:fillRef idx="1">
+            <a:schemeClr val="accent1"/>
+          </a:fillRef>
+          <a:effectRef idx="0">
+            <a:schemeClr val="accent1"/>
+          </a:effectRef>
+          <a:fontRef idx="minor">
+            <a:schemeClr val="lt1"/>
+          </a:fontRef>
+        </p:style>
+        <p:txBody>
+          <a:bodyPr rtlCol="0" anchor="ctr"/>
+          <a:lstStyle/>
+          <a:p>
+            <a:pPr algn="ctr"/>
+            <a:r>
+              <a:rPr lang="en-US" smtClean="0"/>
+              <a:t>Update award</a:t>
+            </a:r>
+            <a:endParaRPr lang="en-US"/>
+          </a:p>
+        </p:txBody>
+      </p:sp>
+      <p:sp>
+        <p:nvSpPr>
+          <p:cNvPr id="130" name="Rectangle 129"/>
+          <p:cNvSpPr/>
+          <p:nvPr/>
+        </p:nvSpPr>
+        <p:spPr>
+          <a:xfrm>
+            <a:off x="7428001" y="4800600"/>
+            <a:ext cx="1468546" cy="304800"/>
+          </a:xfrm>
+          <a:prstGeom prst="rect">
+            <a:avLst/>
+          </a:prstGeom>
+        </p:spPr>
+        <p:style>
+          <a:lnRef idx="2">
+            <a:schemeClr val="accent1">
+              <a:shade val="50000"/>
+            </a:schemeClr>
+          </a:lnRef>
+          <a:fillRef idx="1">
+            <a:schemeClr val="accent1"/>
+          </a:fillRef>
+          <a:effectRef idx="0">
+            <a:schemeClr val="accent1"/>
+          </a:effectRef>
+          <a:fontRef idx="minor">
+            <a:schemeClr val="lt1"/>
+          </a:fontRef>
+        </p:style>
+        <p:txBody>
+          <a:bodyPr rtlCol="0" anchor="ctr"/>
+          <a:lstStyle/>
+          <a:p>
+            <a:pPr algn="ctr"/>
+            <a:r>
+              <a:rPr lang="en-US" smtClean="0"/>
+              <a:t>User history</a:t>
+            </a:r>
+            <a:endParaRPr lang="en-US"/>
+          </a:p>
+        </p:txBody>
+      </p:sp>
+      <p:sp>
+        <p:nvSpPr>
+          <p:cNvPr id="132" name="Rectangle 131"/>
+          <p:cNvSpPr/>
+          <p:nvPr/>
+        </p:nvSpPr>
+        <p:spPr>
+          <a:xfrm>
+            <a:off x="3238444" y="5678675"/>
+            <a:ext cx="1144060" cy="682247"/>
+          </a:xfrm>
+          <a:prstGeom prst="rect">
+            <a:avLst/>
+          </a:prstGeom>
+        </p:spPr>
+        <p:style>
+          <a:lnRef idx="2">
+            <a:schemeClr val="accent1">
+              <a:shade val="50000"/>
+            </a:schemeClr>
+          </a:lnRef>
+          <a:fillRef idx="1">
+            <a:schemeClr val="accent1"/>
+          </a:fillRef>
+          <a:effectRef idx="0">
+            <a:schemeClr val="accent1"/>
+          </a:effectRef>
+          <a:fontRef idx="minor">
+            <a:schemeClr val="lt1"/>
+          </a:fontRef>
+        </p:style>
+        <p:txBody>
+          <a:bodyPr rtlCol="0" anchor="ctr"/>
+          <a:lstStyle/>
+          <a:p>
+            <a:pPr algn="ctr"/>
+            <a:r>
+              <a:rPr lang="en-US" smtClean="0"/>
+              <a:t>Send message</a:t>
+            </a:r>
+            <a:endParaRPr lang="en-US"/>
+          </a:p>
+        </p:txBody>
+      </p:sp>
+      <p:cxnSp>
+        <p:nvCxnSpPr>
+          <p:cNvPr id="138" name="Straight Arrow Connector 137"/>
+          <p:cNvCxnSpPr>
+            <a:stCxn id="126" idx="2"/>
+            <a:endCxn id="132" idx="0"/>
+          </p:cNvCxnSpPr>
+          <p:nvPr/>
+        </p:nvCxnSpPr>
+        <p:spPr>
+          <a:xfrm flipH="1">
+            <a:off x="3810474" y="5105400"/>
+            <a:ext cx="1103896" cy="573275"/>
+          </a:xfrm>
+          <a:prstGeom prst="straightConnector1">
+            <a:avLst/>
+          </a:prstGeom>
+          <a:ln>
+            <a:tailEnd type="triangle"/>
+          </a:ln>
+        </p:spPr>
+        <p:style>
+          <a:lnRef idx="1">
+            <a:schemeClr val="accent1"/>
+          </a:lnRef>
+          <a:fillRef idx="0">
+            <a:schemeClr val="accent1"/>
+          </a:fillRef>
+          <a:effectRef idx="0">
+            <a:schemeClr val="accent1"/>
+          </a:effectRef>
+          <a:fontRef idx="minor">
+            <a:schemeClr val="tx1"/>
+          </a:fontRef>
+        </p:style>
+      </p:cxnSp>
+      <p:cxnSp>
+        <p:nvCxnSpPr>
+          <p:cNvPr id="140" name="Straight Arrow Connector 139"/>
+          <p:cNvCxnSpPr>
+            <a:stCxn id="126" idx="2"/>
+            <a:endCxn id="127" idx="0"/>
+          </p:cNvCxnSpPr>
+          <p:nvPr/>
+        </p:nvCxnSpPr>
+        <p:spPr>
+          <a:xfrm>
+            <a:off x="4914370" y="5105400"/>
+            <a:ext cx="193329" cy="573275"/>
+          </a:xfrm>
+          <a:prstGeom prst="straightConnector1">
+            <a:avLst/>
+          </a:prstGeom>
+          <a:ln>
+            <a:tailEnd type="triangle"/>
+          </a:ln>
+        </p:spPr>
+        <p:style>
+          <a:lnRef idx="1">
+            <a:schemeClr val="accent1"/>
+          </a:lnRef>
+          <a:fillRef idx="0">
+            <a:schemeClr val="accent1"/>
+          </a:fillRef>
+          <a:effectRef idx="0">
+            <a:schemeClr val="accent1"/>
+          </a:effectRef>
+          <a:fontRef idx="minor">
+            <a:schemeClr val="tx1"/>
+          </a:fontRef>
+        </p:style>
+      </p:cxnSp>
+      <p:cxnSp>
+        <p:nvCxnSpPr>
+          <p:cNvPr id="143" name="Straight Arrow Connector 142"/>
+          <p:cNvCxnSpPr>
+            <a:stCxn id="113" idx="2"/>
+            <a:endCxn id="126" idx="0"/>
+          </p:cNvCxnSpPr>
+          <p:nvPr/>
+        </p:nvCxnSpPr>
+        <p:spPr>
+          <a:xfrm flipH="1">
+            <a:off x="4914370" y="4092939"/>
+            <a:ext cx="1873425" cy="707661"/>
+          </a:xfrm>
+          <a:prstGeom prst="straightConnector1">
+            <a:avLst/>
+          </a:prstGeom>
+          <a:ln>
+            <a:tailEnd type="triangle"/>
+          </a:ln>
+        </p:spPr>
+        <p:style>
+          <a:lnRef idx="1">
+            <a:schemeClr val="accent1"/>
+          </a:lnRef>
+          <a:fillRef idx="0">
+            <a:schemeClr val="accent1"/>
+          </a:fillRef>
+          <a:effectRef idx="0">
+            <a:schemeClr val="accent1"/>
+          </a:effectRef>
+          <a:fontRef idx="minor">
+            <a:schemeClr val="tx1"/>
+          </a:fontRef>
+        </p:style>
+      </p:cxnSp>
+      <p:cxnSp>
+        <p:nvCxnSpPr>
+          <p:cNvPr id="145" name="Straight Arrow Connector 144"/>
+          <p:cNvCxnSpPr>
+            <a:stCxn id="113" idx="2"/>
+            <a:endCxn id="128" idx="0"/>
+          </p:cNvCxnSpPr>
+          <p:nvPr/>
+        </p:nvCxnSpPr>
+        <p:spPr>
+          <a:xfrm flipH="1">
+            <a:off x="6504727" y="4092939"/>
+            <a:ext cx="283068" cy="707661"/>
+          </a:xfrm>
+          <a:prstGeom prst="straightConnector1">
+            <a:avLst/>
+          </a:prstGeom>
+          <a:ln>
+            <a:tailEnd type="triangle"/>
+          </a:ln>
+        </p:spPr>
+        <p:style>
+          <a:lnRef idx="1">
+            <a:schemeClr val="accent1"/>
+          </a:lnRef>
+          <a:fillRef idx="0">
+            <a:schemeClr val="accent1"/>
+          </a:fillRef>
+          <a:effectRef idx="0">
+            <a:schemeClr val="accent1"/>
+          </a:effectRef>
+          <a:fontRef idx="minor">
+            <a:schemeClr val="tx1"/>
+          </a:fontRef>
+        </p:style>
+      </p:cxnSp>
+      <p:cxnSp>
+        <p:nvCxnSpPr>
+          <p:cNvPr id="147" name="Straight Arrow Connector 146"/>
+          <p:cNvCxnSpPr>
+            <a:stCxn id="113" idx="2"/>
+            <a:endCxn id="130" idx="0"/>
+          </p:cNvCxnSpPr>
+          <p:nvPr/>
+        </p:nvCxnSpPr>
+        <p:spPr>
+          <a:xfrm>
+            <a:off x="6787795" y="4092939"/>
+            <a:ext cx="1374479" cy="707661"/>
+          </a:xfrm>
+          <a:prstGeom prst="straightConnector1">
+            <a:avLst/>
+          </a:prstGeom>
+          <a:ln>
+            <a:tailEnd type="triangle"/>
+          </a:ln>
+        </p:spPr>
+        <p:style>
+          <a:lnRef idx="1">
+            <a:schemeClr val="accent1"/>
+          </a:lnRef>
+          <a:fillRef idx="0">
+            <a:schemeClr val="accent1"/>
+          </a:fillRef>
+          <a:effectRef idx="0">
+            <a:schemeClr val="accent1"/>
+          </a:effectRef>
+          <a:fontRef idx="minor">
+            <a:schemeClr val="tx1"/>
+          </a:fontRef>
+        </p:style>
+      </p:cxnSp>
+      <p:cxnSp>
+        <p:nvCxnSpPr>
+          <p:cNvPr id="149" name="Straight Arrow Connector 148"/>
+          <p:cNvCxnSpPr>
+            <a:stCxn id="128" idx="2"/>
+            <a:endCxn id="129" idx="0"/>
+          </p:cNvCxnSpPr>
+          <p:nvPr/>
+        </p:nvCxnSpPr>
+        <p:spPr>
+          <a:xfrm>
+            <a:off x="6504727" y="5105400"/>
+            <a:ext cx="0" cy="573276"/>
+          </a:xfrm>
+          <a:prstGeom prst="straightConnector1">
+            <a:avLst/>
+          </a:prstGeom>
+          <a:ln>
+            <a:tailEnd type="triangle"/>
+          </a:ln>
+        </p:spPr>
+        <p:style>
+          <a:lnRef idx="1">
+            <a:schemeClr val="accent1"/>
+          </a:lnRef>
+          <a:fillRef idx="0">
+            <a:schemeClr val="accent1"/>
+          </a:fillRef>
+          <a:effectRef idx="0">
+            <a:schemeClr val="accent1"/>
+          </a:effectRef>
+          <a:fontRef idx="minor">
+            <a:schemeClr val="tx1"/>
+          </a:fontRef>
+        </p:style>
+      </p:cxnSp>
+    </p:spTree>
+    <p:extLst>
+      <p:ext uri="{BB962C8B-B14F-4D97-AF65-F5344CB8AC3E}">
+        <p14:creationId xmlns:p14="http://schemas.microsoft.com/office/powerpoint/2010/main" val="1713928481"/>
       </p:ext>
     </p:extLst>
   </p:cSld>

</xml_diff>